<commit_message>
final push before review
</commit_message>
<xml_diff>
--- a/mod4_non_technical.pptx
+++ b/mod4_non_technical.pptx
@@ -12,8 +12,8 @@
     <p:sldId id="257" r:id="rId6"/>
     <p:sldId id="258" r:id="rId7"/>
     <p:sldId id="259" r:id="rId8"/>
-    <p:sldId id="261" r:id="rId9"/>
-    <p:sldId id="262" r:id="rId10"/>
+    <p:sldId id="262" r:id="rId9"/>
+    <p:sldId id="261" r:id="rId10"/>
   </p:sldIdLst>
   <p:sldSz cx="12192000" cy="6858000"/>
   <p:notesSz cx="6858000" cy="9144000"/>
@@ -132,8 +132,8 @@
 <pc:chgInfo xmlns:a="http://schemas.openxmlformats.org/drawingml/2006/main" xmlns:r="http://schemas.openxmlformats.org/officeDocument/2006/relationships" xmlns:ac="http://schemas.microsoft.com/office/drawing/2013/main/command" xmlns:pc="http://schemas.microsoft.com/office/powerpoint/2013/main/command">
   <pc:docChgLst>
     <pc:chgData name="Michael" userId="0df92e9667c24698" providerId="LiveId" clId="{FC0B3909-3CB4-47DF-9012-CE0364DFA015}"/>
-    <pc:docChg chg="undo custSel mod addSld delSld modSld">
-      <pc:chgData name="Michael" userId="0df92e9667c24698" providerId="LiveId" clId="{FC0B3909-3CB4-47DF-9012-CE0364DFA015}" dt="2020-12-11T04:57:20.420" v="2626" actId="20577"/>
+    <pc:docChg chg="undo custSel mod addSld delSld modSld sldOrd">
+      <pc:chgData name="Michael" userId="0df92e9667c24698" providerId="LiveId" clId="{FC0B3909-3CB4-47DF-9012-CE0364DFA015}" dt="2020-12-11T23:02:35.850" v="2890" actId="14100"/>
       <pc:docMkLst>
         <pc:docMk/>
       </pc:docMkLst>
@@ -383,7 +383,7 @@
         </pc:picChg>
       </pc:sldChg>
       <pc:sldChg chg="addSp delSp modSp new mod setBg setClrOvrMap">
-        <pc:chgData name="Michael" userId="0df92e9667c24698" providerId="LiveId" clId="{FC0B3909-3CB4-47DF-9012-CE0364DFA015}" dt="2020-12-11T04:56:59.110" v="2594" actId="1076"/>
+        <pc:chgData name="Michael" userId="0df92e9667c24698" providerId="LiveId" clId="{FC0B3909-3CB4-47DF-9012-CE0364DFA015}" dt="2020-12-11T22:59:12.033" v="2791" actId="20577"/>
         <pc:sldMkLst>
           <pc:docMk/>
           <pc:sldMk cId="1689214189" sldId="259"/>
@@ -397,7 +397,7 @@
           </ac:spMkLst>
         </pc:spChg>
         <pc:spChg chg="mod">
-          <ac:chgData name="Michael" userId="0df92e9667c24698" providerId="LiveId" clId="{FC0B3909-3CB4-47DF-9012-CE0364DFA015}" dt="2020-12-11T04:56:59.110" v="2594" actId="1076"/>
+          <ac:chgData name="Michael" userId="0df92e9667c24698" providerId="LiveId" clId="{FC0B3909-3CB4-47DF-9012-CE0364DFA015}" dt="2020-12-11T22:59:12.033" v="2791" actId="20577"/>
           <ac:spMkLst>
             <pc:docMk/>
             <pc:sldMk cId="1689214189" sldId="259"/>
@@ -595,20 +595,92 @@
           </ac:picMkLst>
         </pc:picChg>
       </pc:sldChg>
-      <pc:sldChg chg="modSp new mod">
-        <pc:chgData name="Michael" userId="0df92e9667c24698" providerId="LiveId" clId="{FC0B3909-3CB4-47DF-9012-CE0364DFA015}" dt="2020-12-11T04:57:20.420" v="2626" actId="20577"/>
+      <pc:sldChg chg="addSp delSp modSp new mod ord setBg setClrOvrMap">
+        <pc:chgData name="Michael" userId="0df92e9667c24698" providerId="LiveId" clId="{FC0B3909-3CB4-47DF-9012-CE0364DFA015}" dt="2020-12-11T23:01:48.415" v="2887"/>
         <pc:sldMkLst>
           <pc:docMk/>
           <pc:sldMk cId="132749155" sldId="262"/>
         </pc:sldMkLst>
         <pc:spChg chg="mod">
-          <ac:chgData name="Michael" userId="0df92e9667c24698" providerId="LiveId" clId="{FC0B3909-3CB4-47DF-9012-CE0364DFA015}" dt="2020-12-11T04:57:20.420" v="2626" actId="20577"/>
+          <ac:chgData name="Michael" userId="0df92e9667c24698" providerId="LiveId" clId="{FC0B3909-3CB4-47DF-9012-CE0364DFA015}" dt="2020-12-11T23:01:03.821" v="2813" actId="26606"/>
           <ac:spMkLst>
             <pc:docMk/>
             <pc:sldMk cId="132749155" sldId="262"/>
             <ac:spMk id="2" creationId="{353FE7C9-54AD-4BBC-83FA-D290B26D8EC3}"/>
           </ac:spMkLst>
         </pc:spChg>
+        <pc:spChg chg="mod">
+          <ac:chgData name="Michael" userId="0df92e9667c24698" providerId="LiveId" clId="{FC0B3909-3CB4-47DF-9012-CE0364DFA015}" dt="2020-12-11T23:01:42.629" v="2885" actId="20577"/>
+          <ac:spMkLst>
+            <pc:docMk/>
+            <pc:sldMk cId="132749155" sldId="262"/>
+            <ac:spMk id="3" creationId="{B97A1823-27EC-49FE-BA15-4853E54C8225}"/>
+          </ac:spMkLst>
+        </pc:spChg>
+        <pc:spChg chg="add del">
+          <ac:chgData name="Michael" userId="0df92e9667c24698" providerId="LiveId" clId="{FC0B3909-3CB4-47DF-9012-CE0364DFA015}" dt="2020-12-11T23:00:28.164" v="2809" actId="26606"/>
+          <ac:spMkLst>
+            <pc:docMk/>
+            <pc:sldMk cId="132749155" sldId="262"/>
+            <ac:spMk id="10" creationId="{E0D60ECE-8986-45DC-B7FE-EC7699B466B8}"/>
+          </ac:spMkLst>
+        </pc:spChg>
+        <pc:spChg chg="add del">
+          <ac:chgData name="Michael" userId="0df92e9667c24698" providerId="LiveId" clId="{FC0B3909-3CB4-47DF-9012-CE0364DFA015}" dt="2020-12-11T23:00:28.164" v="2809" actId="26606"/>
+          <ac:spMkLst>
+            <pc:docMk/>
+            <pc:sldMk cId="132749155" sldId="262"/>
+            <ac:spMk id="12" creationId="{96964194-5878-40D2-8EC0-DDC58387FA56}"/>
+          </ac:spMkLst>
+        </pc:spChg>
+        <pc:spChg chg="add del">
+          <ac:chgData name="Michael" userId="0df92e9667c24698" providerId="LiveId" clId="{FC0B3909-3CB4-47DF-9012-CE0364DFA015}" dt="2020-12-11T23:01:03.821" v="2813" actId="26606"/>
+          <ac:spMkLst>
+            <pc:docMk/>
+            <pc:sldMk cId="132749155" sldId="262"/>
+            <ac:spMk id="14" creationId="{3CD9DF72-87A3-404E-A828-84CBF11A8303}"/>
+          </ac:spMkLst>
+        </pc:spChg>
+        <pc:picChg chg="add mod ord">
+          <ac:chgData name="Michael" userId="0df92e9667c24698" providerId="LiveId" clId="{FC0B3909-3CB4-47DF-9012-CE0364DFA015}" dt="2020-12-11T23:01:03.825" v="2814" actId="26606"/>
+          <ac:picMkLst>
+            <pc:docMk/>
+            <pc:sldMk cId="132749155" sldId="262"/>
+            <ac:picMk id="5" creationId="{F9FE86F7-F15F-4B69-A47B-631DBA861A8E}"/>
+          </ac:picMkLst>
+        </pc:picChg>
+        <pc:picChg chg="add del">
+          <ac:chgData name="Michael" userId="0df92e9667c24698" providerId="LiveId" clId="{FC0B3909-3CB4-47DF-9012-CE0364DFA015}" dt="2020-12-11T23:00:28.164" v="2809" actId="26606"/>
+          <ac:picMkLst>
+            <pc:docMk/>
+            <pc:sldMk cId="132749155" sldId="262"/>
+            <ac:picMk id="7" creationId="{983C21BB-F6DB-424F-A259-4C68FF9E1F5E}"/>
+          </ac:picMkLst>
+        </pc:picChg>
+        <pc:cxnChg chg="add del">
+          <ac:chgData name="Michael" userId="0df92e9667c24698" providerId="LiveId" clId="{FC0B3909-3CB4-47DF-9012-CE0364DFA015}" dt="2020-12-11T23:01:03.825" v="2814" actId="26606"/>
+          <ac:cxnSpMkLst>
+            <pc:docMk/>
+            <pc:sldMk cId="132749155" sldId="262"/>
+            <ac:cxnSpMk id="9" creationId="{A7F400EE-A8A5-48AF-B4D6-291B52C6F0B0}"/>
+          </ac:cxnSpMkLst>
+        </pc:cxnChg>
+        <pc:cxnChg chg="add del">
+          <ac:chgData name="Michael" userId="0df92e9667c24698" providerId="LiveId" clId="{FC0B3909-3CB4-47DF-9012-CE0364DFA015}" dt="2020-12-11T23:01:03.821" v="2813" actId="26606"/>
+          <ac:cxnSpMkLst>
+            <pc:docMk/>
+            <pc:sldMk cId="132749155" sldId="262"/>
+            <ac:cxnSpMk id="16" creationId="{20E3A342-4D61-4E3F-AF90-1AB42AEB96CC}"/>
+          </ac:cxnSpMkLst>
+        </pc:cxnChg>
+        <pc:cxnChg chg="add">
+          <ac:chgData name="Michael" userId="0df92e9667c24698" providerId="LiveId" clId="{FC0B3909-3CB4-47DF-9012-CE0364DFA015}" dt="2020-12-11T23:01:03.825" v="2814" actId="26606"/>
+          <ac:cxnSpMkLst>
+            <pc:docMk/>
+            <pc:sldMk cId="132749155" sldId="262"/>
+            <ac:cxnSpMk id="18" creationId="{A7F400EE-A8A5-48AF-B4D6-291B52C6F0B0}"/>
+          </ac:cxnSpMkLst>
+        </pc:cxnChg>
       </pc:sldChg>
       <pc:sldChg chg="addSp delSp modSp new del mod setBg">
         <pc:chgData name="Michael" userId="0df92e9667c24698" providerId="LiveId" clId="{FC0B3909-3CB4-47DF-9012-CE0364DFA015}" dt="2020-12-11T04:54:34.823" v="2531" actId="47"/>
@@ -983,13 +1055,13 @@
         </pc:spChg>
       </pc:sldChg>
       <pc:sldChg chg="addSp delSp modSp new mod setBg setClrOvrMap">
-        <pc:chgData name="Michael" userId="0df92e9667c24698" providerId="LiveId" clId="{FC0B3909-3CB4-47DF-9012-CE0364DFA015}" dt="2020-12-11T04:22:43.127" v="1771" actId="14100"/>
+        <pc:chgData name="Michael" userId="0df92e9667c24698" providerId="LiveId" clId="{FC0B3909-3CB4-47DF-9012-CE0364DFA015}" dt="2020-12-11T22:57:56.641" v="2642" actId="20577"/>
         <pc:sldMkLst>
           <pc:docMk/>
           <pc:sldMk cId="2368937311" sldId="266"/>
         </pc:sldMkLst>
         <pc:spChg chg="mod">
-          <ac:chgData name="Michael" userId="0df92e9667c24698" providerId="LiveId" clId="{FC0B3909-3CB4-47DF-9012-CE0364DFA015}" dt="2020-12-11T04:22:37.717" v="1769" actId="26606"/>
+          <ac:chgData name="Michael" userId="0df92e9667c24698" providerId="LiveId" clId="{FC0B3909-3CB4-47DF-9012-CE0364DFA015}" dt="2020-12-11T22:57:56.641" v="2642" actId="20577"/>
           <ac:spMkLst>
             <pc:docMk/>
             <pc:sldMk cId="2368937311" sldId="266"/>
@@ -1086,13 +1158,13 @@
         </pc:cxnChg>
       </pc:sldChg>
       <pc:sldChg chg="addSp delSp modSp new mod setBg">
-        <pc:chgData name="Michael" userId="0df92e9667c24698" providerId="LiveId" clId="{FC0B3909-3CB4-47DF-9012-CE0364DFA015}" dt="2020-12-11T04:54:21.072" v="2530" actId="403"/>
+        <pc:chgData name="Michael" userId="0df92e9667c24698" providerId="LiveId" clId="{FC0B3909-3CB4-47DF-9012-CE0364DFA015}" dt="2020-12-11T23:02:35.850" v="2890" actId="14100"/>
         <pc:sldMkLst>
           <pc:docMk/>
           <pc:sldMk cId="724215323" sldId="267"/>
         </pc:sldMkLst>
         <pc:spChg chg="mod">
-          <ac:chgData name="Michael" userId="0df92e9667c24698" providerId="LiveId" clId="{FC0B3909-3CB4-47DF-9012-CE0364DFA015}" dt="2020-12-11T04:54:09.440" v="2528" actId="14100"/>
+          <ac:chgData name="Michael" userId="0df92e9667c24698" providerId="LiveId" clId="{FC0B3909-3CB4-47DF-9012-CE0364DFA015}" dt="2020-12-11T22:58:11.519" v="2662" actId="1076"/>
           <ac:spMkLst>
             <pc:docMk/>
             <pc:sldMk cId="724215323" sldId="267"/>
@@ -1116,7 +1188,7 @@
           </ac:spMkLst>
         </pc:spChg>
         <pc:spChg chg="add mod">
-          <ac:chgData name="Michael" userId="0df92e9667c24698" providerId="LiveId" clId="{FC0B3909-3CB4-47DF-9012-CE0364DFA015}" dt="2020-12-11T04:54:21.072" v="2530" actId="403"/>
+          <ac:chgData name="Michael" userId="0df92e9667c24698" providerId="LiveId" clId="{FC0B3909-3CB4-47DF-9012-CE0364DFA015}" dt="2020-12-11T23:02:35.850" v="2890" actId="14100"/>
           <ac:spMkLst>
             <pc:docMk/>
             <pc:sldMk cId="724215323" sldId="267"/>
@@ -1340,7 +1412,7 @@
           <a:p>
             <a:fld id="{B9B3AFAD-72F5-479A-AACE-CD1470DC2D7E}" type="datetimeFigureOut">
               <a:rPr lang="en-US" smtClean="0"/>
-              <a:t>12/4/2020</a:t>
+              <a:t>12/11/2020</a:t>
             </a:fld>
             <a:endParaRPr lang="en-US"/>
           </a:p>
@@ -1538,7 +1610,7 @@
           <a:p>
             <a:fld id="{B9B3AFAD-72F5-479A-AACE-CD1470DC2D7E}" type="datetimeFigureOut">
               <a:rPr lang="en-US" smtClean="0"/>
-              <a:t>12/4/2020</a:t>
+              <a:t>12/11/2020</a:t>
             </a:fld>
             <a:endParaRPr lang="en-US"/>
           </a:p>
@@ -1746,7 +1818,7 @@
           <a:p>
             <a:fld id="{B9B3AFAD-72F5-479A-AACE-CD1470DC2D7E}" type="datetimeFigureOut">
               <a:rPr lang="en-US" smtClean="0"/>
-              <a:t>12/4/2020</a:t>
+              <a:t>12/11/2020</a:t>
             </a:fld>
             <a:endParaRPr lang="en-US"/>
           </a:p>
@@ -1944,7 +2016,7 @@
           <a:p>
             <a:fld id="{B9B3AFAD-72F5-479A-AACE-CD1470DC2D7E}" type="datetimeFigureOut">
               <a:rPr lang="en-US" smtClean="0"/>
-              <a:t>12/4/2020</a:t>
+              <a:t>12/11/2020</a:t>
             </a:fld>
             <a:endParaRPr lang="en-US"/>
           </a:p>
@@ -2219,7 +2291,7 @@
           <a:p>
             <a:fld id="{B9B3AFAD-72F5-479A-AACE-CD1470DC2D7E}" type="datetimeFigureOut">
               <a:rPr lang="en-US" smtClean="0"/>
-              <a:t>12/4/2020</a:t>
+              <a:t>12/11/2020</a:t>
             </a:fld>
             <a:endParaRPr lang="en-US"/>
           </a:p>
@@ -2484,7 +2556,7 @@
           <a:p>
             <a:fld id="{B9B3AFAD-72F5-479A-AACE-CD1470DC2D7E}" type="datetimeFigureOut">
               <a:rPr lang="en-US" smtClean="0"/>
-              <a:t>12/4/2020</a:t>
+              <a:t>12/11/2020</a:t>
             </a:fld>
             <a:endParaRPr lang="en-US"/>
           </a:p>
@@ -2896,7 +2968,7 @@
           <a:p>
             <a:fld id="{B9B3AFAD-72F5-479A-AACE-CD1470DC2D7E}" type="datetimeFigureOut">
               <a:rPr lang="en-US" smtClean="0"/>
-              <a:t>12/4/2020</a:t>
+              <a:t>12/11/2020</a:t>
             </a:fld>
             <a:endParaRPr lang="en-US"/>
           </a:p>
@@ -3037,7 +3109,7 @@
           <a:p>
             <a:fld id="{B9B3AFAD-72F5-479A-AACE-CD1470DC2D7E}" type="datetimeFigureOut">
               <a:rPr lang="en-US" smtClean="0"/>
-              <a:t>12/4/2020</a:t>
+              <a:t>12/11/2020</a:t>
             </a:fld>
             <a:endParaRPr lang="en-US"/>
           </a:p>
@@ -3150,7 +3222,7 @@
           <a:p>
             <a:fld id="{B9B3AFAD-72F5-479A-AACE-CD1470DC2D7E}" type="datetimeFigureOut">
               <a:rPr lang="en-US" smtClean="0"/>
-              <a:t>12/4/2020</a:t>
+              <a:t>12/11/2020</a:t>
             </a:fld>
             <a:endParaRPr lang="en-US"/>
           </a:p>
@@ -3461,7 +3533,7 @@
           <a:p>
             <a:fld id="{B9B3AFAD-72F5-479A-AACE-CD1470DC2D7E}" type="datetimeFigureOut">
               <a:rPr lang="en-US" smtClean="0"/>
-              <a:t>12/4/2020</a:t>
+              <a:t>12/11/2020</a:t>
             </a:fld>
             <a:endParaRPr lang="en-US"/>
           </a:p>
@@ -3749,7 +3821,7 @@
           <a:p>
             <a:fld id="{B9B3AFAD-72F5-479A-AACE-CD1470DC2D7E}" type="datetimeFigureOut">
               <a:rPr lang="en-US" smtClean="0"/>
-              <a:t>12/4/2020</a:t>
+              <a:t>12/11/2020</a:t>
             </a:fld>
             <a:endParaRPr lang="en-US"/>
           </a:p>
@@ -3990,7 +4062,7 @@
           <a:p>
             <a:fld id="{B9B3AFAD-72F5-479A-AACE-CD1470DC2D7E}" type="datetimeFigureOut">
               <a:rPr lang="en-US" smtClean="0"/>
-              <a:t>12/4/2020</a:t>
+              <a:t>12/11/2020</a:t>
             </a:fld>
             <a:endParaRPr lang="en-US"/>
           </a:p>
@@ -5964,6 +6036,13 @@
           <a:p>
             <a:r>
               <a:rPr lang="en-US" sz="4000" dirty="0"/>
+              <a:t>Recommendation:</a:t>
+            </a:r>
+            <a:br>
+              <a:rPr lang="en-US" sz="4000" dirty="0"/>
+            </a:br>
+            <a:r>
+              <a:rPr lang="en-US" sz="4000" dirty="0"/>
               <a:t>Triage</a:t>
             </a:r>
           </a:p>
@@ -6223,16 +6302,37 @@
         </p:nvSpPr>
         <p:spPr>
           <a:xfrm>
-            <a:off x="9252252" y="549791"/>
-            <a:ext cx="2469624" cy="826205"/>
+            <a:off x="8584999" y="440445"/>
+            <a:ext cx="3706353" cy="826205"/>
           </a:xfrm>
         </p:spPr>
         <p:txBody>
           <a:bodyPr vert="horz" lIns="91440" tIns="45720" rIns="91440" bIns="45720" rtlCol="0" anchor="t">
-            <a:normAutofit/>
+            <a:normAutofit fontScale="90000"/>
           </a:bodyPr>
           <a:lstStyle/>
           <a:p>
+            <a:r>
+              <a:rPr lang="en-US" sz="3400" kern="1200" dirty="0">
+                <a:solidFill>
+                  <a:schemeClr val="tx1"/>
+                </a:solidFill>
+                <a:latin typeface="+mj-lt"/>
+                <a:ea typeface="+mj-ea"/>
+                <a:cs typeface="+mj-cs"/>
+              </a:rPr>
+              <a:t>Recommendation:</a:t>
+            </a:r>
+            <a:br>
+              <a:rPr lang="en-US" sz="3400" kern="1200" dirty="0">
+                <a:solidFill>
+                  <a:schemeClr val="tx1"/>
+                </a:solidFill>
+                <a:latin typeface="+mj-lt"/>
+                <a:ea typeface="+mj-ea"/>
+                <a:cs typeface="+mj-cs"/>
+              </a:rPr>
+            </a:br>
             <a:r>
               <a:rPr lang="en-US" sz="3400" kern="1200" dirty="0">
                 <a:solidFill>
@@ -6261,8 +6361,8 @@
         </p:nvSpPr>
         <p:spPr>
           <a:xfrm>
-            <a:off x="9252251" y="1214380"/>
-            <a:ext cx="2446465" cy="1178298"/>
+            <a:off x="9065125" y="1347545"/>
+            <a:ext cx="2769321" cy="1178298"/>
           </a:xfrm>
           <a:prstGeom prst="rect">
             <a:avLst/>
@@ -6295,13 +6395,15 @@
             </a:r>
           </a:p>
           <a:p>
-            <a:pPr>
+            <a:pPr marL="285750" indent="-285750">
               <a:lnSpc>
                 <a:spcPct val="90000"/>
               </a:lnSpc>
               <a:spcBef>
                 <a:spcPts val="1000"/>
               </a:spcBef>
+              <a:buFont typeface="Arial" panose="020B0604020202020204" pitchFamily="34" charset="0"/>
+              <a:buChar char="•"/>
             </a:pPr>
             <a:r>
               <a:rPr lang="en-US" sz="1600" kern="1200" dirty="0">
@@ -6368,13 +6470,15 @@
             </a:r>
           </a:p>
           <a:p>
-            <a:pPr>
+            <a:pPr marL="285750" indent="-285750">
               <a:lnSpc>
                 <a:spcPct val="90000"/>
               </a:lnSpc>
               <a:spcBef>
                 <a:spcPts val="1000"/>
               </a:spcBef>
+              <a:buFont typeface="Arial" panose="020B0604020202020204" pitchFamily="34" charset="0"/>
+              <a:buChar char="•"/>
             </a:pPr>
             <a:r>
               <a:rPr lang="en-US" sz="1600" kern="1200" dirty="0">
@@ -7812,13 +7916,13 @@
         </p:spPr>
         <p:txBody>
           <a:bodyPr anchor="t">
-            <a:normAutofit/>
+            <a:normAutofit fontScale="92500" lnSpcReduction="10000"/>
           </a:bodyPr>
           <a:lstStyle/>
           <a:p>
             <a:r>
               <a:rPr lang="en-US" sz="1800" dirty="0"/>
-              <a:t>These images are what layer activations that give some insight into what the model has extracted from the X-Rays in order to make its classifications. </a:t>
+              <a:t>These images are examples of looking at the data through the models “eyes” . While not crystal clear, they do give some insight into what the model has extracted from the X-Rays in order to make its classifications. </a:t>
             </a:r>
           </a:p>
           <a:p>
@@ -8027,6 +8131,225 @@
 </file>
 
 <file path=ppt/slides/slide8.xml><?xml version="1.0" encoding="utf-8"?>
+<p:sld xmlns:a="http://schemas.openxmlformats.org/drawingml/2006/main" xmlns:r="http://schemas.openxmlformats.org/officeDocument/2006/relationships" xmlns:p="http://schemas.openxmlformats.org/presentationml/2006/main">
+  <p:cSld>
+    <p:bg>
+      <p:bgPr>
+        <a:solidFill>
+          <a:schemeClr val="bg1"/>
+        </a:solidFill>
+        <a:effectLst/>
+      </p:bgPr>
+    </p:bg>
+    <p:spTree>
+      <p:nvGrpSpPr>
+        <p:cNvPr id="1" name=""/>
+        <p:cNvGrpSpPr/>
+        <p:nvPr/>
+      </p:nvGrpSpPr>
+      <p:grpSpPr>
+        <a:xfrm>
+          <a:off x="0" y="0"/>
+          <a:ext cx="0" cy="0"/>
+          <a:chOff x="0" y="0"/>
+          <a:chExt cx="0" cy="0"/>
+        </a:xfrm>
+      </p:grpSpPr>
+      <p:sp>
+        <p:nvSpPr>
+          <p:cNvPr id="2" name="Title 1">
+            <a:extLst>
+              <a:ext uri="{FF2B5EF4-FFF2-40B4-BE49-F238E27FC236}">
+                <a16:creationId xmlns:a16="http://schemas.microsoft.com/office/drawing/2014/main" id="{353FE7C9-54AD-4BBC-83FA-D290B26D8EC3}"/>
+              </a:ext>
+            </a:extLst>
+          </p:cNvPr>
+          <p:cNvSpPr>
+            <a:spLocks noGrp="1"/>
+          </p:cNvSpPr>
+          <p:nvPr>
+            <p:ph type="title"/>
+          </p:nvPr>
+        </p:nvSpPr>
+        <p:spPr>
+          <a:xfrm>
+            <a:off x="4965430" y="629268"/>
+            <a:ext cx="6586491" cy="1286160"/>
+          </a:xfrm>
+        </p:spPr>
+        <p:txBody>
+          <a:bodyPr anchor="b">
+            <a:normAutofit/>
+          </a:bodyPr>
+          <a:lstStyle/>
+          <a:p>
+            <a:r>
+              <a:rPr lang="en-US" sz="4100"/>
+              <a:t>Future Work: There’s Lots Still To Do</a:t>
+            </a:r>
+            <a:endParaRPr lang="en-US" sz="4100" dirty="0"/>
+          </a:p>
+        </p:txBody>
+      </p:sp>
+      <p:sp>
+        <p:nvSpPr>
+          <p:cNvPr id="3" name="Content Placeholder 2">
+            <a:extLst>
+              <a:ext uri="{FF2B5EF4-FFF2-40B4-BE49-F238E27FC236}">
+                <a16:creationId xmlns:a16="http://schemas.microsoft.com/office/drawing/2014/main" id="{B97A1823-27EC-49FE-BA15-4853E54C8225}"/>
+              </a:ext>
+            </a:extLst>
+          </p:cNvPr>
+          <p:cNvSpPr>
+            <a:spLocks noGrp="1"/>
+          </p:cNvSpPr>
+          <p:nvPr>
+            <p:ph idx="1"/>
+          </p:nvPr>
+        </p:nvSpPr>
+        <p:spPr>
+          <a:xfrm>
+            <a:off x="4965431" y="2438400"/>
+            <a:ext cx="6586489" cy="3785419"/>
+          </a:xfrm>
+        </p:spPr>
+        <p:txBody>
+          <a:bodyPr>
+            <a:normAutofit/>
+          </a:bodyPr>
+          <a:lstStyle/>
+          <a:p>
+            <a:r>
+              <a:rPr lang="en-US" sz="2000" b="0" dirty="0">
+                <a:effectLst/>
+              </a:rPr>
+              <a:t>Additional image augmentation and sampling techniques</a:t>
+            </a:r>
+          </a:p>
+          <a:p>
+            <a:r>
+              <a:rPr lang="en-US" sz="2000" b="0" dirty="0">
+                <a:effectLst/>
+              </a:rPr>
+              <a:t>Non-Sequential Modeling</a:t>
+            </a:r>
+          </a:p>
+          <a:p>
+            <a:r>
+              <a:rPr lang="en-US" sz="2000" b="0" dirty="0">
+                <a:effectLst/>
+              </a:rPr>
+              <a:t>Detecting and weight</a:t>
+            </a:r>
+            <a:r>
+              <a:rPr lang="en-US" sz="2000" dirty="0"/>
+              <a:t>ing edge cases</a:t>
+            </a:r>
+            <a:endParaRPr lang="en-US" sz="2000" b="0" dirty="0">
+              <a:effectLst/>
+            </a:endParaRPr>
+          </a:p>
+          <a:p>
+            <a:endParaRPr lang="en-US" sz="2000" dirty="0"/>
+          </a:p>
+        </p:txBody>
+      </p:sp>
+      <p:pic>
+        <p:nvPicPr>
+          <p:cNvPr id="5" name="Picture 4">
+            <a:extLst>
+              <a:ext uri="{FF2B5EF4-FFF2-40B4-BE49-F238E27FC236}">
+                <a16:creationId xmlns:a16="http://schemas.microsoft.com/office/drawing/2014/main" id="{F9FE86F7-F15F-4B69-A47B-631DBA861A8E}"/>
+              </a:ext>
+            </a:extLst>
+          </p:cNvPr>
+          <p:cNvPicPr>
+            <a:picLocks noChangeAspect="1"/>
+          </p:cNvPicPr>
+          <p:nvPr/>
+        </p:nvPicPr>
+        <p:blipFill rotWithShape="1">
+          <a:blip r:embed="rId2"/>
+          <a:srcRect l="20055" r="34826" b="-1"/>
+          <a:stretch/>
+        </p:blipFill>
+        <p:spPr>
+          <a:xfrm>
+            <a:off x="20" y="10"/>
+            <a:ext cx="4635571" cy="6857990"/>
+          </a:xfrm>
+          <a:prstGeom prst="rect">
+            <a:avLst/>
+          </a:prstGeom>
+          <a:effectLst/>
+        </p:spPr>
+      </p:pic>
+      <p:cxnSp>
+        <p:nvCxnSpPr>
+          <p:cNvPr id="18" name="Straight Connector 13">
+            <a:extLst>
+              <a:ext uri="{FF2B5EF4-FFF2-40B4-BE49-F238E27FC236}">
+                <a16:creationId xmlns:a16="http://schemas.microsoft.com/office/drawing/2014/main" id="{A7F400EE-A8A5-48AF-B4D6-291B52C6F0B0}"/>
+              </a:ext>
+              <a:ext uri="{C183D7F6-B498-43B3-948B-1728B52AA6E4}">
+                <adec:decorative xmlns:adec="http://schemas.microsoft.com/office/drawing/2017/decorative" val="1"/>
+              </a:ext>
+            </a:extLst>
+          </p:cNvPr>
+          <p:cNvCxnSpPr>
+            <a:cxnSpLocks noGrp="1" noRot="1" noChangeAspect="1" noMove="1" noResize="1" noEditPoints="1" noAdjustHandles="1" noChangeArrowheads="1" noChangeShapeType="1"/>
+          </p:cNvCxnSpPr>
+          <p:nvPr>
+            <p:extLst>
+              <p:ext uri="{386F3935-93C4-4BCD-93E2-E3B085C9AB24}">
+                <p16:designElem xmlns:p16="http://schemas.microsoft.com/office/powerpoint/2015/main" val="1"/>
+              </p:ext>
+            </p:extLst>
+          </p:nvPr>
+        </p:nvCxnSpPr>
+        <p:spPr>
+          <a:xfrm>
+            <a:off x="5080934" y="2115117"/>
+            <a:ext cx="6309360" cy="0"/>
+          </a:xfrm>
+          <a:prstGeom prst="line">
+            <a:avLst/>
+          </a:prstGeom>
+          <a:ln w="19050">
+            <a:solidFill>
+              <a:srgbClr val="56708D"/>
+            </a:solidFill>
+          </a:ln>
+        </p:spPr>
+        <p:style>
+          <a:lnRef idx="1">
+            <a:schemeClr val="accent1"/>
+          </a:lnRef>
+          <a:fillRef idx="0">
+            <a:schemeClr val="accent1"/>
+          </a:fillRef>
+          <a:effectRef idx="0">
+            <a:schemeClr val="accent1"/>
+          </a:effectRef>
+          <a:fontRef idx="minor">
+            <a:schemeClr val="tx1"/>
+          </a:fontRef>
+        </p:style>
+      </p:cxnSp>
+    </p:spTree>
+    <p:extLst>
+      <p:ext uri="{BB962C8B-B14F-4D97-AF65-F5344CB8AC3E}">
+        <p14:creationId xmlns:p14="http://schemas.microsoft.com/office/powerpoint/2010/main" val="132749155"/>
+      </p:ext>
+    </p:extLst>
+  </p:cSld>
+  <p:clrMapOvr>
+    <a:masterClrMapping/>
+  </p:clrMapOvr>
+</p:sld>
+</file>
+
+<file path=ppt/slides/slide9.xml><?xml version="1.0" encoding="utf-8"?>
 <p:sld xmlns:a="http://schemas.openxmlformats.org/drawingml/2006/main" xmlns:r="http://schemas.openxmlformats.org/officeDocument/2006/relationships" xmlns:p="http://schemas.openxmlformats.org/presentationml/2006/main">
   <p:cSld>
     <p:bg>
@@ -8486,89 +8809,6 @@
     <p:extLst>
       <p:ext uri="{BB962C8B-B14F-4D97-AF65-F5344CB8AC3E}">
         <p14:creationId xmlns:p14="http://schemas.microsoft.com/office/powerpoint/2010/main" val="3801439958"/>
-      </p:ext>
-    </p:extLst>
-  </p:cSld>
-  <p:clrMapOvr>
-    <a:masterClrMapping/>
-  </p:clrMapOvr>
-</p:sld>
-</file>
-
-<file path=ppt/slides/slide9.xml><?xml version="1.0" encoding="utf-8"?>
-<p:sld xmlns:a="http://schemas.openxmlformats.org/drawingml/2006/main" xmlns:r="http://schemas.openxmlformats.org/officeDocument/2006/relationships" xmlns:p="http://schemas.openxmlformats.org/presentationml/2006/main">
-  <p:cSld>
-    <p:spTree>
-      <p:nvGrpSpPr>
-        <p:cNvPr id="1" name=""/>
-        <p:cNvGrpSpPr/>
-        <p:nvPr/>
-      </p:nvGrpSpPr>
-      <p:grpSpPr>
-        <a:xfrm>
-          <a:off x="0" y="0"/>
-          <a:ext cx="0" cy="0"/>
-          <a:chOff x="0" y="0"/>
-          <a:chExt cx="0" cy="0"/>
-        </a:xfrm>
-      </p:grpSpPr>
-      <p:sp>
-        <p:nvSpPr>
-          <p:cNvPr id="2" name="Title 1">
-            <a:extLst>
-              <a:ext uri="{FF2B5EF4-FFF2-40B4-BE49-F238E27FC236}">
-                <a16:creationId xmlns:a16="http://schemas.microsoft.com/office/drawing/2014/main" id="{353FE7C9-54AD-4BBC-83FA-D290B26D8EC3}"/>
-              </a:ext>
-            </a:extLst>
-          </p:cNvPr>
-          <p:cNvSpPr>
-            <a:spLocks noGrp="1"/>
-          </p:cNvSpPr>
-          <p:nvPr>
-            <p:ph type="title"/>
-          </p:nvPr>
-        </p:nvSpPr>
-        <p:spPr/>
-        <p:txBody>
-          <a:bodyPr/>
-          <a:lstStyle/>
-          <a:p>
-            <a:r>
-              <a:rPr lang="en-US" dirty="0"/>
-              <a:t>Future Work: There’s Lots Still To Do</a:t>
-            </a:r>
-          </a:p>
-        </p:txBody>
-      </p:sp>
-      <p:sp>
-        <p:nvSpPr>
-          <p:cNvPr id="3" name="Content Placeholder 2">
-            <a:extLst>
-              <a:ext uri="{FF2B5EF4-FFF2-40B4-BE49-F238E27FC236}">
-                <a16:creationId xmlns:a16="http://schemas.microsoft.com/office/drawing/2014/main" id="{B97A1823-27EC-49FE-BA15-4853E54C8225}"/>
-              </a:ext>
-            </a:extLst>
-          </p:cNvPr>
-          <p:cNvSpPr>
-            <a:spLocks noGrp="1"/>
-          </p:cNvSpPr>
-          <p:nvPr>
-            <p:ph idx="1"/>
-          </p:nvPr>
-        </p:nvSpPr>
-        <p:spPr/>
-        <p:txBody>
-          <a:bodyPr/>
-          <a:lstStyle/>
-          <a:p>
-            <a:endParaRPr lang="en-US" dirty="0"/>
-          </a:p>
-        </p:txBody>
-      </p:sp>
-    </p:spTree>
-    <p:extLst>
-      <p:ext uri="{BB962C8B-B14F-4D97-AF65-F5344CB8AC3E}">
-        <p14:creationId xmlns:p14="http://schemas.microsoft.com/office/powerpoint/2010/main" val="132749155"/>
       </p:ext>
     </p:extLst>
   </p:cSld>

</xml_diff>